<commit_message>
Uppdaterat POM i powerpoint v2
</commit_message>
<xml_diff>
--- a/docs/Slutredovisning_grp5_v2.pptx
+++ b/docs/Slutredovisning_grp5_v2.pptx
@@ -7966,7 +7966,12 @@
             <p:ph idx="1"/>
           </p:nvPr>
         </p:nvSpPr>
-        <p:spPr/>
+        <p:spPr>
+          <a:xfrm>
+            <a:off x="838201" y="1690688"/>
+            <a:ext cx="4775200" cy="4067175"/>
+          </a:xfrm>
+        </p:spPr>
         <p:txBody>
           <a:bodyPr>
             <a:normAutofit fontScale="25000" lnSpcReduction="20000"/>
@@ -9165,6 +9170,714 @@
               <a:rPr lang="sv-SE" dirty="0"/>
               <a:t>&gt;</a:t>
             </a:r>
+            <a:br>
+              <a:rPr lang="sv-SE" dirty="0"/>
+            </a:br>
+            <a:r>
+              <a:rPr lang="sv-SE" dirty="0"/>
+              <a:t>&lt;/</a:t>
+            </a:r>
+            <a:r>
+              <a:rPr lang="sv-SE" dirty="0" err="1"/>
+              <a:t>project</a:t>
+            </a:r>
+            <a:r>
+              <a:rPr lang="sv-SE" dirty="0"/>
+              <a:t>&gt;</a:t>
+            </a:r>
+            <a:br>
+              <a:rPr lang="sv-SE" dirty="0"/>
+            </a:br>
+            <a:endParaRPr lang="sv-SE" dirty="0"/>
+          </a:p>
+        </p:txBody>
+      </p:sp>
+      <p:sp>
+        <p:nvSpPr>
+          <p:cNvPr id="4" name="Platshållare för innehåll 2">
+            <a:extLst>
+              <a:ext uri="{FF2B5EF4-FFF2-40B4-BE49-F238E27FC236}">
+                <a16:creationId xmlns:a16="http://schemas.microsoft.com/office/drawing/2014/main" id="{7502AE00-9333-EB4B-95D9-391326FD9AE0}"/>
+              </a:ext>
+            </a:extLst>
+          </p:cNvPr>
+          <p:cNvSpPr txBox="1">
+            <a:spLocks/>
+          </p:cNvSpPr>
+          <p:nvPr/>
+        </p:nvSpPr>
+        <p:spPr>
+          <a:xfrm>
+            <a:off x="6578600" y="1690688"/>
+            <a:ext cx="4775200" cy="4067175"/>
+          </a:xfrm>
+          <a:prstGeom prst="rect">
+            <a:avLst/>
+          </a:prstGeom>
+        </p:spPr>
+        <p:txBody>
+          <a:bodyPr vert="horz" lIns="91440" tIns="45720" rIns="91440" bIns="45720" rtlCol="0">
+            <a:normAutofit fontScale="40000" lnSpcReduction="20000"/>
+          </a:bodyPr>
+          <a:lstStyle>
+            <a:lvl1pPr marL="228600" indent="-228600" algn="l" defTabSz="914400" rtl="0" eaLnBrk="1" latinLnBrk="0" hangingPunct="1">
+              <a:lnSpc>
+                <a:spcPct val="90000"/>
+              </a:lnSpc>
+              <a:spcBef>
+                <a:spcPts val="1000"/>
+              </a:spcBef>
+              <a:buFont typeface="Arial" panose="020B0604020202020204" pitchFamily="34" charset="0"/>
+              <a:buChar char="•"/>
+              <a:defRPr sz="2800" kern="1200">
+                <a:solidFill>
+                  <a:schemeClr val="tx1"/>
+                </a:solidFill>
+                <a:latin typeface="+mn-lt"/>
+                <a:ea typeface="+mn-ea"/>
+                <a:cs typeface="+mn-cs"/>
+              </a:defRPr>
+            </a:lvl1pPr>
+            <a:lvl2pPr marL="685800" indent="-228600" algn="l" defTabSz="914400" rtl="0" eaLnBrk="1" latinLnBrk="0" hangingPunct="1">
+              <a:lnSpc>
+                <a:spcPct val="90000"/>
+              </a:lnSpc>
+              <a:spcBef>
+                <a:spcPts val="500"/>
+              </a:spcBef>
+              <a:buFont typeface="Arial" panose="020B0604020202020204" pitchFamily="34" charset="0"/>
+              <a:buChar char="•"/>
+              <a:defRPr sz="2400" kern="1200">
+                <a:solidFill>
+                  <a:schemeClr val="tx1"/>
+                </a:solidFill>
+                <a:latin typeface="+mn-lt"/>
+                <a:ea typeface="+mn-ea"/>
+                <a:cs typeface="+mn-cs"/>
+              </a:defRPr>
+            </a:lvl2pPr>
+            <a:lvl3pPr marL="1143000" indent="-228600" algn="l" defTabSz="914400" rtl="0" eaLnBrk="1" latinLnBrk="0" hangingPunct="1">
+              <a:lnSpc>
+                <a:spcPct val="90000"/>
+              </a:lnSpc>
+              <a:spcBef>
+                <a:spcPts val="500"/>
+              </a:spcBef>
+              <a:buFont typeface="Arial" panose="020B0604020202020204" pitchFamily="34" charset="0"/>
+              <a:buChar char="•"/>
+              <a:defRPr sz="2000" kern="1200">
+                <a:solidFill>
+                  <a:schemeClr val="tx1"/>
+                </a:solidFill>
+                <a:latin typeface="+mn-lt"/>
+                <a:ea typeface="+mn-ea"/>
+                <a:cs typeface="+mn-cs"/>
+              </a:defRPr>
+            </a:lvl3pPr>
+            <a:lvl4pPr marL="1600200" indent="-228600" algn="l" defTabSz="914400" rtl="0" eaLnBrk="1" latinLnBrk="0" hangingPunct="1">
+              <a:lnSpc>
+                <a:spcPct val="90000"/>
+              </a:lnSpc>
+              <a:spcBef>
+                <a:spcPts val="500"/>
+              </a:spcBef>
+              <a:buFont typeface="Arial" panose="020B0604020202020204" pitchFamily="34" charset="0"/>
+              <a:buChar char="•"/>
+              <a:defRPr sz="1800" kern="1200">
+                <a:solidFill>
+                  <a:schemeClr val="tx1"/>
+                </a:solidFill>
+                <a:latin typeface="+mn-lt"/>
+                <a:ea typeface="+mn-ea"/>
+                <a:cs typeface="+mn-cs"/>
+              </a:defRPr>
+            </a:lvl4pPr>
+            <a:lvl5pPr marL="2057400" indent="-228600" algn="l" defTabSz="914400" rtl="0" eaLnBrk="1" latinLnBrk="0" hangingPunct="1">
+              <a:lnSpc>
+                <a:spcPct val="90000"/>
+              </a:lnSpc>
+              <a:spcBef>
+                <a:spcPts val="500"/>
+              </a:spcBef>
+              <a:buFont typeface="Arial" panose="020B0604020202020204" pitchFamily="34" charset="0"/>
+              <a:buChar char="•"/>
+              <a:defRPr sz="1800" kern="1200">
+                <a:solidFill>
+                  <a:schemeClr val="tx1"/>
+                </a:solidFill>
+                <a:latin typeface="+mn-lt"/>
+                <a:ea typeface="+mn-ea"/>
+                <a:cs typeface="+mn-cs"/>
+              </a:defRPr>
+            </a:lvl5pPr>
+            <a:lvl6pPr marL="2514600" indent="-228600" algn="l" defTabSz="914400" rtl="0" eaLnBrk="1" latinLnBrk="0" hangingPunct="1">
+              <a:lnSpc>
+                <a:spcPct val="90000"/>
+              </a:lnSpc>
+              <a:spcBef>
+                <a:spcPts val="500"/>
+              </a:spcBef>
+              <a:buFont typeface="Arial" panose="020B0604020202020204" pitchFamily="34" charset="0"/>
+              <a:buChar char="•"/>
+              <a:defRPr sz="1800" kern="1200">
+                <a:solidFill>
+                  <a:schemeClr val="tx1"/>
+                </a:solidFill>
+                <a:latin typeface="+mn-lt"/>
+                <a:ea typeface="+mn-ea"/>
+                <a:cs typeface="+mn-cs"/>
+              </a:defRPr>
+            </a:lvl6pPr>
+            <a:lvl7pPr marL="2971800" indent="-228600" algn="l" defTabSz="914400" rtl="0" eaLnBrk="1" latinLnBrk="0" hangingPunct="1">
+              <a:lnSpc>
+                <a:spcPct val="90000"/>
+              </a:lnSpc>
+              <a:spcBef>
+                <a:spcPts val="500"/>
+              </a:spcBef>
+              <a:buFont typeface="Arial" panose="020B0604020202020204" pitchFamily="34" charset="0"/>
+              <a:buChar char="•"/>
+              <a:defRPr sz="1800" kern="1200">
+                <a:solidFill>
+                  <a:schemeClr val="tx1"/>
+                </a:solidFill>
+                <a:latin typeface="+mn-lt"/>
+                <a:ea typeface="+mn-ea"/>
+                <a:cs typeface="+mn-cs"/>
+              </a:defRPr>
+            </a:lvl7pPr>
+            <a:lvl8pPr marL="3429000" indent="-228600" algn="l" defTabSz="914400" rtl="0" eaLnBrk="1" latinLnBrk="0" hangingPunct="1">
+              <a:lnSpc>
+                <a:spcPct val="90000"/>
+              </a:lnSpc>
+              <a:spcBef>
+                <a:spcPts val="500"/>
+              </a:spcBef>
+              <a:buFont typeface="Arial" panose="020B0604020202020204" pitchFamily="34" charset="0"/>
+              <a:buChar char="•"/>
+              <a:defRPr sz="1800" kern="1200">
+                <a:solidFill>
+                  <a:schemeClr val="tx1"/>
+                </a:solidFill>
+                <a:latin typeface="+mn-lt"/>
+                <a:ea typeface="+mn-ea"/>
+                <a:cs typeface="+mn-cs"/>
+              </a:defRPr>
+            </a:lvl8pPr>
+            <a:lvl9pPr marL="3886200" indent="-228600" algn="l" defTabSz="914400" rtl="0" eaLnBrk="1" latinLnBrk="0" hangingPunct="1">
+              <a:lnSpc>
+                <a:spcPct val="90000"/>
+              </a:lnSpc>
+              <a:spcBef>
+                <a:spcPts val="500"/>
+              </a:spcBef>
+              <a:buFont typeface="Arial" panose="020B0604020202020204" pitchFamily="34" charset="0"/>
+              <a:buChar char="•"/>
+              <a:defRPr sz="1800" kern="1200">
+                <a:solidFill>
+                  <a:schemeClr val="tx1"/>
+                </a:solidFill>
+                <a:latin typeface="+mn-lt"/>
+                <a:ea typeface="+mn-ea"/>
+                <a:cs typeface="+mn-cs"/>
+              </a:defRPr>
+            </a:lvl9pPr>
+          </a:lstStyle>
+          <a:p>
+            <a:pPr marL="0" indent="0">
+              <a:buFont typeface="Arial" panose="020B0604020202020204" pitchFamily="34" charset="0"/>
+              <a:buNone/>
+            </a:pPr>
+            <a:r>
+              <a:rPr lang="sv-SE" dirty="0"/>
+              <a:t>&lt;?</a:t>
+            </a:r>
+            <a:r>
+              <a:rPr lang="sv-SE" dirty="0" err="1"/>
+              <a:t>xml</a:t>
+            </a:r>
+            <a:r>
+              <a:rPr lang="sv-SE" dirty="0"/>
+              <a:t> version="1.0" </a:t>
+            </a:r>
+            <a:r>
+              <a:rPr lang="sv-SE" dirty="0" err="1"/>
+              <a:t>encoding</a:t>
+            </a:r>
+            <a:r>
+              <a:rPr lang="sv-SE" dirty="0"/>
+              <a:t>="UTF-8"?&gt;</a:t>
+            </a:r>
+            <a:br>
+              <a:rPr lang="sv-SE" dirty="0"/>
+            </a:br>
+            <a:br>
+              <a:rPr lang="sv-SE" dirty="0"/>
+            </a:br>
+            <a:r>
+              <a:rPr lang="sv-SE" dirty="0"/>
+              <a:t>&lt;</a:t>
+            </a:r>
+            <a:r>
+              <a:rPr lang="sv-SE" dirty="0" err="1"/>
+              <a:t>project</a:t>
+            </a:r>
+            <a:r>
+              <a:rPr lang="sv-SE" dirty="0"/>
+              <a:t> </a:t>
+            </a:r>
+            <a:r>
+              <a:rPr lang="sv-SE" dirty="0" err="1"/>
+              <a:t>xmlns</a:t>
+            </a:r>
+            <a:r>
+              <a:rPr lang="sv-SE" dirty="0"/>
+              <a:t>="http://</a:t>
+            </a:r>
+            <a:r>
+              <a:rPr lang="sv-SE" dirty="0" err="1"/>
+              <a:t>maven.apache.org</a:t>
+            </a:r>
+            <a:r>
+              <a:rPr lang="sv-SE" dirty="0"/>
+              <a:t>/POM/4.0.0" </a:t>
+            </a:r>
+            <a:r>
+              <a:rPr lang="sv-SE" dirty="0" err="1"/>
+              <a:t>xmlns:xsi</a:t>
+            </a:r>
+            <a:r>
+              <a:rPr lang="sv-SE" dirty="0"/>
+              <a:t>="http://www.w3.org/2001/</a:t>
+            </a:r>
+            <a:r>
+              <a:rPr lang="sv-SE" dirty="0" err="1"/>
+              <a:t>XMLSchema-instance</a:t>
+            </a:r>
+            <a:r>
+              <a:rPr lang="sv-SE" dirty="0"/>
+              <a:t>"</a:t>
+            </a:r>
+            <a:br>
+              <a:rPr lang="sv-SE" dirty="0"/>
+            </a:br>
+            <a:r>
+              <a:rPr lang="sv-SE" dirty="0"/>
+              <a:t>  </a:t>
+            </a:r>
+            <a:r>
+              <a:rPr lang="sv-SE" dirty="0" err="1"/>
+              <a:t>xsi:schemaLocation</a:t>
+            </a:r>
+            <a:r>
+              <a:rPr lang="sv-SE" dirty="0"/>
+              <a:t>="http://</a:t>
+            </a:r>
+            <a:r>
+              <a:rPr lang="sv-SE" dirty="0" err="1"/>
+              <a:t>maven.apache.org</a:t>
+            </a:r>
+            <a:r>
+              <a:rPr lang="sv-SE" dirty="0"/>
+              <a:t>/POM/4.0.0 http://</a:t>
+            </a:r>
+            <a:r>
+              <a:rPr lang="sv-SE" dirty="0" err="1"/>
+              <a:t>maven.apache.org</a:t>
+            </a:r>
+            <a:r>
+              <a:rPr lang="sv-SE" dirty="0"/>
+              <a:t>/</a:t>
+            </a:r>
+            <a:r>
+              <a:rPr lang="sv-SE" dirty="0" err="1"/>
+              <a:t>xsd</a:t>
+            </a:r>
+            <a:r>
+              <a:rPr lang="sv-SE" dirty="0"/>
+              <a:t>/maven-4.0.0.xsd"&gt;</a:t>
+            </a:r>
+            <a:br>
+              <a:rPr lang="sv-SE" dirty="0"/>
+            </a:br>
+            <a:r>
+              <a:rPr lang="sv-SE" dirty="0"/>
+              <a:t>  &lt;</a:t>
+            </a:r>
+            <a:r>
+              <a:rPr lang="sv-SE" dirty="0" err="1"/>
+              <a:t>modelVersion</a:t>
+            </a:r>
+            <a:r>
+              <a:rPr lang="sv-SE" dirty="0"/>
+              <a:t>&gt;4.0.0&lt;/</a:t>
+            </a:r>
+            <a:r>
+              <a:rPr lang="sv-SE" dirty="0" err="1"/>
+              <a:t>modelVersion</a:t>
+            </a:r>
+            <a:r>
+              <a:rPr lang="sv-SE" dirty="0"/>
+              <a:t>&gt;</a:t>
+            </a:r>
+            <a:br>
+              <a:rPr lang="sv-SE" dirty="0"/>
+            </a:br>
+            <a:br>
+              <a:rPr lang="sv-SE" dirty="0"/>
+            </a:br>
+            <a:r>
+              <a:rPr lang="sv-SE" dirty="0"/>
+              <a:t>  &lt;</a:t>
+            </a:r>
+            <a:r>
+              <a:rPr lang="sv-SE" dirty="0" err="1"/>
+              <a:t>groupId</a:t>
+            </a:r>
+            <a:r>
+              <a:rPr lang="sv-SE" dirty="0"/>
+              <a:t>&gt;se.inte.group5&lt;/</a:t>
+            </a:r>
+            <a:r>
+              <a:rPr lang="sv-SE" dirty="0" err="1"/>
+              <a:t>groupId</a:t>
+            </a:r>
+            <a:r>
+              <a:rPr lang="sv-SE" dirty="0"/>
+              <a:t>&gt;</a:t>
+            </a:r>
+            <a:br>
+              <a:rPr lang="sv-SE" dirty="0"/>
+            </a:br>
+            <a:r>
+              <a:rPr lang="sv-SE" dirty="0"/>
+              <a:t>  &lt;</a:t>
+            </a:r>
+            <a:r>
+              <a:rPr lang="sv-SE" dirty="0" err="1"/>
+              <a:t>artifactId</a:t>
+            </a:r>
+            <a:r>
+              <a:rPr lang="sv-SE" dirty="0"/>
+              <a:t>&gt;</a:t>
+            </a:r>
+            <a:r>
+              <a:rPr lang="sv-SE" dirty="0" err="1"/>
+              <a:t>InteGame</a:t>
+            </a:r>
+            <a:r>
+              <a:rPr lang="sv-SE" dirty="0"/>
+              <a:t>&lt;/</a:t>
+            </a:r>
+            <a:r>
+              <a:rPr lang="sv-SE" dirty="0" err="1"/>
+              <a:t>artifactId</a:t>
+            </a:r>
+            <a:r>
+              <a:rPr lang="sv-SE" dirty="0"/>
+              <a:t>&gt;</a:t>
+            </a:r>
+            <a:br>
+              <a:rPr lang="sv-SE" dirty="0"/>
+            </a:br>
+            <a:r>
+              <a:rPr lang="sv-SE" dirty="0"/>
+              <a:t>  &lt;version&gt;1.0-SNAPSHOT&lt;/version&gt;</a:t>
+            </a:r>
+            <a:br>
+              <a:rPr lang="sv-SE" dirty="0"/>
+            </a:br>
+            <a:br>
+              <a:rPr lang="sv-SE" dirty="0"/>
+            </a:br>
+            <a:r>
+              <a:rPr lang="sv-SE" dirty="0"/>
+              <a:t>  &lt;</a:t>
+            </a:r>
+            <a:r>
+              <a:rPr lang="sv-SE" dirty="0" err="1"/>
+              <a:t>name</a:t>
+            </a:r>
+            <a:r>
+              <a:rPr lang="sv-SE" dirty="0"/>
+              <a:t>&gt;</a:t>
+            </a:r>
+            <a:r>
+              <a:rPr lang="sv-SE" dirty="0" err="1"/>
+              <a:t>InteGame</a:t>
+            </a:r>
+            <a:r>
+              <a:rPr lang="sv-SE" dirty="0"/>
+              <a:t>&lt;/</a:t>
+            </a:r>
+            <a:r>
+              <a:rPr lang="sv-SE" dirty="0" err="1"/>
+              <a:t>name</a:t>
+            </a:r>
+            <a:r>
+              <a:rPr lang="sv-SE" dirty="0"/>
+              <a:t>&gt;</a:t>
+            </a:r>
+            <a:br>
+              <a:rPr lang="sv-SE" dirty="0"/>
+            </a:br>
+            <a:br>
+              <a:rPr lang="sv-SE" dirty="0"/>
+            </a:br>
+            <a:r>
+              <a:rPr lang="sv-SE" dirty="0"/>
+              <a:t>  &lt;</a:t>
+            </a:r>
+            <a:r>
+              <a:rPr lang="sv-SE" dirty="0" err="1"/>
+              <a:t>properties</a:t>
+            </a:r>
+            <a:r>
+              <a:rPr lang="sv-SE" dirty="0"/>
+              <a:t>&gt;</a:t>
+            </a:r>
+            <a:br>
+              <a:rPr lang="sv-SE" dirty="0"/>
+            </a:br>
+            <a:r>
+              <a:rPr lang="sv-SE" dirty="0"/>
+              <a:t>    &lt;</a:t>
+            </a:r>
+            <a:r>
+              <a:rPr lang="sv-SE" dirty="0" err="1"/>
+              <a:t>project.build.sourceEncoding</a:t>
+            </a:r>
+            <a:r>
+              <a:rPr lang="sv-SE" dirty="0"/>
+              <a:t>&gt;UTF-8&lt;/</a:t>
+            </a:r>
+            <a:r>
+              <a:rPr lang="sv-SE" dirty="0" err="1"/>
+              <a:t>project.build.sourceEncoding</a:t>
+            </a:r>
+            <a:r>
+              <a:rPr lang="sv-SE" dirty="0"/>
+              <a:t>&gt;</a:t>
+            </a:r>
+            <a:br>
+              <a:rPr lang="sv-SE" dirty="0"/>
+            </a:br>
+            <a:r>
+              <a:rPr lang="sv-SE" dirty="0"/>
+              <a:t>    &lt;</a:t>
+            </a:r>
+            <a:r>
+              <a:rPr lang="sv-SE" dirty="0" err="1"/>
+              <a:t>maven.compiler.source</a:t>
+            </a:r>
+            <a:r>
+              <a:rPr lang="sv-SE" dirty="0"/>
+              <a:t>&gt;1.7&lt;/</a:t>
+            </a:r>
+            <a:r>
+              <a:rPr lang="sv-SE" dirty="0" err="1"/>
+              <a:t>maven.compiler.source</a:t>
+            </a:r>
+            <a:r>
+              <a:rPr lang="sv-SE" dirty="0"/>
+              <a:t>&gt;</a:t>
+            </a:r>
+            <a:br>
+              <a:rPr lang="sv-SE" dirty="0"/>
+            </a:br>
+            <a:r>
+              <a:rPr lang="sv-SE" dirty="0"/>
+              <a:t>    &lt;</a:t>
+            </a:r>
+            <a:r>
+              <a:rPr lang="sv-SE" dirty="0" err="1"/>
+              <a:t>maven.compiler.target</a:t>
+            </a:r>
+            <a:r>
+              <a:rPr lang="sv-SE" dirty="0"/>
+              <a:t>&gt;1.7&lt;/</a:t>
+            </a:r>
+            <a:r>
+              <a:rPr lang="sv-SE" dirty="0" err="1"/>
+              <a:t>maven.compiler.target</a:t>
+            </a:r>
+            <a:r>
+              <a:rPr lang="sv-SE" dirty="0"/>
+              <a:t>&gt;</a:t>
+            </a:r>
+            <a:br>
+              <a:rPr lang="sv-SE" dirty="0"/>
+            </a:br>
+            <a:r>
+              <a:rPr lang="sv-SE" dirty="0"/>
+              <a:t>  &lt;/</a:t>
+            </a:r>
+            <a:r>
+              <a:rPr lang="sv-SE" dirty="0" err="1"/>
+              <a:t>properties</a:t>
+            </a:r>
+            <a:r>
+              <a:rPr lang="sv-SE" dirty="0"/>
+              <a:t>&gt;</a:t>
+            </a:r>
+            <a:br>
+              <a:rPr lang="sv-SE" dirty="0"/>
+            </a:br>
+            <a:br>
+              <a:rPr lang="sv-SE" dirty="0"/>
+            </a:br>
+            <a:r>
+              <a:rPr lang="sv-SE" dirty="0"/>
+              <a:t>  &lt;</a:t>
+            </a:r>
+            <a:r>
+              <a:rPr lang="sv-SE" dirty="0" err="1"/>
+              <a:t>dependencies</a:t>
+            </a:r>
+            <a:r>
+              <a:rPr lang="sv-SE" dirty="0"/>
+              <a:t>&gt;</a:t>
+            </a:r>
+            <a:br>
+              <a:rPr lang="sv-SE" dirty="0"/>
+            </a:br>
+            <a:r>
+              <a:rPr lang="sv-SE" dirty="0"/>
+              <a:t>    &lt;</a:t>
+            </a:r>
+            <a:r>
+              <a:rPr lang="sv-SE" dirty="0" err="1"/>
+              <a:t>dependency</a:t>
+            </a:r>
+            <a:r>
+              <a:rPr lang="sv-SE" dirty="0"/>
+              <a:t>&gt;</a:t>
+            </a:r>
+            <a:br>
+              <a:rPr lang="sv-SE" dirty="0"/>
+            </a:br>
+            <a:r>
+              <a:rPr lang="sv-SE" dirty="0"/>
+              <a:t>      &lt;</a:t>
+            </a:r>
+            <a:r>
+              <a:rPr lang="sv-SE" dirty="0" err="1"/>
+              <a:t>groupId</a:t>
+            </a:r>
+            <a:r>
+              <a:rPr lang="sv-SE" dirty="0"/>
+              <a:t>&gt;</a:t>
+            </a:r>
+            <a:r>
+              <a:rPr lang="sv-SE" dirty="0" err="1"/>
+              <a:t>junit</a:t>
+            </a:r>
+            <a:r>
+              <a:rPr lang="sv-SE" dirty="0"/>
+              <a:t>&lt;/</a:t>
+            </a:r>
+            <a:r>
+              <a:rPr lang="sv-SE" dirty="0" err="1"/>
+              <a:t>groupId</a:t>
+            </a:r>
+            <a:r>
+              <a:rPr lang="sv-SE" dirty="0"/>
+              <a:t>&gt;</a:t>
+            </a:r>
+            <a:br>
+              <a:rPr lang="sv-SE" dirty="0"/>
+            </a:br>
+            <a:r>
+              <a:rPr lang="sv-SE" dirty="0"/>
+              <a:t>      &lt;</a:t>
+            </a:r>
+            <a:r>
+              <a:rPr lang="sv-SE" dirty="0" err="1"/>
+              <a:t>artifactId</a:t>
+            </a:r>
+            <a:r>
+              <a:rPr lang="sv-SE" dirty="0"/>
+              <a:t>&gt;</a:t>
+            </a:r>
+            <a:r>
+              <a:rPr lang="sv-SE" dirty="0" err="1"/>
+              <a:t>junit</a:t>
+            </a:r>
+            <a:r>
+              <a:rPr lang="sv-SE" dirty="0"/>
+              <a:t>&lt;/</a:t>
+            </a:r>
+            <a:r>
+              <a:rPr lang="sv-SE" dirty="0" err="1"/>
+              <a:t>artifactId</a:t>
+            </a:r>
+            <a:r>
+              <a:rPr lang="sv-SE" dirty="0"/>
+              <a:t>&gt;</a:t>
+            </a:r>
+            <a:br>
+              <a:rPr lang="sv-SE" dirty="0"/>
+            </a:br>
+            <a:r>
+              <a:rPr lang="sv-SE" dirty="0"/>
+              <a:t>      &lt;version&gt;4.11&lt;/version&gt;</a:t>
+            </a:r>
+            <a:br>
+              <a:rPr lang="sv-SE" dirty="0"/>
+            </a:br>
+            <a:r>
+              <a:rPr lang="sv-SE" dirty="0"/>
+              <a:t>      &lt;</a:t>
+            </a:r>
+            <a:r>
+              <a:rPr lang="sv-SE" dirty="0" err="1"/>
+              <a:t>scope</a:t>
+            </a:r>
+            <a:r>
+              <a:rPr lang="sv-SE" dirty="0"/>
+              <a:t>&gt;test&lt;/</a:t>
+            </a:r>
+            <a:r>
+              <a:rPr lang="sv-SE" dirty="0" err="1"/>
+              <a:t>scope</a:t>
+            </a:r>
+            <a:r>
+              <a:rPr lang="sv-SE" dirty="0"/>
+              <a:t>&gt;</a:t>
+            </a:r>
+            <a:br>
+              <a:rPr lang="sv-SE" dirty="0"/>
+            </a:br>
+            <a:r>
+              <a:rPr lang="sv-SE" dirty="0"/>
+              <a:t>    &lt;/</a:t>
+            </a:r>
+            <a:r>
+              <a:rPr lang="sv-SE" dirty="0" err="1"/>
+              <a:t>dependency</a:t>
+            </a:r>
+            <a:r>
+              <a:rPr lang="sv-SE" dirty="0"/>
+              <a:t>&gt;</a:t>
+            </a:r>
+            <a:br>
+              <a:rPr lang="sv-SE" dirty="0"/>
+            </a:br>
+            <a:r>
+              <a:rPr lang="sv-SE" dirty="0"/>
+              <a:t>  &lt;/</a:t>
+            </a:r>
+            <a:r>
+              <a:rPr lang="sv-SE" dirty="0" err="1"/>
+              <a:t>dependencies</a:t>
+            </a:r>
+            <a:r>
+              <a:rPr lang="sv-SE" dirty="0"/>
+              <a:t>&gt;</a:t>
+            </a:r>
+            <a:br>
+              <a:rPr lang="sv-SE" dirty="0"/>
+            </a:br>
             <a:br>
               <a:rPr lang="sv-SE" dirty="0"/>
             </a:br>

</xml_diff>